<commit_message>
Fix: Remove duplicate thumbs up icon in CSS
</commit_message>
<xml_diff>
--- a/documens/ReplyAI画面ドラフト.pptx
+++ b/documens/ReplyAI画面ドラフト.pptx
@@ -8,6 +8,8 @@
     <p:sldId id="256" r:id="rId2"/>
     <p:sldId id="257" r:id="rId3"/>
     <p:sldId id="258" r:id="rId4"/>
+    <p:sldId id="260" r:id="rId5"/>
+    <p:sldId id="259" r:id="rId6"/>
   </p:sldIdLst>
   <p:sldSz cx="12192000" cy="6858000"/>
   <p:notesSz cx="6858000" cy="9144000"/>
@@ -263,7 +265,7 @@
           <a:p>
             <a:fld id="{11089FC0-EF52-AB45-873F-5F173C052B95}" type="datetimeFigureOut">
               <a:rPr kumimoji="1" lang="ja-US" altLang="en-US" smtClean="0"/>
-              <a:t>12/3/25</a:t>
+              <a:t>12/4/25</a:t>
             </a:fld>
             <a:endParaRPr kumimoji="1" lang="ja-US" altLang="en-US"/>
           </a:p>
@@ -495,7 +497,7 @@
           <a:p>
             <a:fld id="{11089FC0-EF52-AB45-873F-5F173C052B95}" type="datetimeFigureOut">
               <a:rPr kumimoji="1" lang="ja-US" altLang="en-US" smtClean="0"/>
-              <a:t>12/3/25</a:t>
+              <a:t>12/4/25</a:t>
             </a:fld>
             <a:endParaRPr kumimoji="1" lang="ja-US" altLang="en-US"/>
           </a:p>
@@ -737,7 +739,7 @@
           <a:p>
             <a:fld id="{11089FC0-EF52-AB45-873F-5F173C052B95}" type="datetimeFigureOut">
               <a:rPr kumimoji="1" lang="ja-US" altLang="en-US" smtClean="0"/>
-              <a:t>12/3/25</a:t>
+              <a:t>12/4/25</a:t>
             </a:fld>
             <a:endParaRPr kumimoji="1" lang="ja-US" altLang="en-US"/>
           </a:p>
@@ -969,7 +971,7 @@
           <a:p>
             <a:fld id="{11089FC0-EF52-AB45-873F-5F173C052B95}" type="datetimeFigureOut">
               <a:rPr kumimoji="1" lang="ja-US" altLang="en-US" smtClean="0"/>
-              <a:t>12/3/25</a:t>
+              <a:t>12/4/25</a:t>
             </a:fld>
             <a:endParaRPr kumimoji="1" lang="ja-US" altLang="en-US"/>
           </a:p>
@@ -1245,7 +1247,7 @@
           <a:p>
             <a:fld id="{11089FC0-EF52-AB45-873F-5F173C052B95}" type="datetimeFigureOut">
               <a:rPr kumimoji="1" lang="ja-US" altLang="en-US" smtClean="0"/>
-              <a:t>12/3/25</a:t>
+              <a:t>12/4/25</a:t>
             </a:fld>
             <a:endParaRPr kumimoji="1" lang="ja-US" altLang="en-US"/>
           </a:p>
@@ -1577,7 +1579,7 @@
           <a:p>
             <a:fld id="{11089FC0-EF52-AB45-873F-5F173C052B95}" type="datetimeFigureOut">
               <a:rPr kumimoji="1" lang="ja-US" altLang="en-US" smtClean="0"/>
-              <a:t>12/3/25</a:t>
+              <a:t>12/4/25</a:t>
             </a:fld>
             <a:endParaRPr kumimoji="1" lang="ja-US" altLang="en-US"/>
           </a:p>
@@ -2056,7 +2058,7 @@
           <a:p>
             <a:fld id="{11089FC0-EF52-AB45-873F-5F173C052B95}" type="datetimeFigureOut">
               <a:rPr kumimoji="1" lang="ja-US" altLang="en-US" smtClean="0"/>
-              <a:t>12/3/25</a:t>
+              <a:t>12/4/25</a:t>
             </a:fld>
             <a:endParaRPr kumimoji="1" lang="ja-US" altLang="en-US"/>
           </a:p>
@@ -2198,7 +2200,7 @@
           <a:p>
             <a:fld id="{11089FC0-EF52-AB45-873F-5F173C052B95}" type="datetimeFigureOut">
               <a:rPr kumimoji="1" lang="ja-US" altLang="en-US" smtClean="0"/>
-              <a:t>12/3/25</a:t>
+              <a:t>12/4/25</a:t>
             </a:fld>
             <a:endParaRPr kumimoji="1" lang="ja-US" altLang="en-US"/>
           </a:p>
@@ -2311,7 +2313,7 @@
           <a:p>
             <a:fld id="{11089FC0-EF52-AB45-873F-5F173C052B95}" type="datetimeFigureOut">
               <a:rPr kumimoji="1" lang="ja-US" altLang="en-US" smtClean="0"/>
-              <a:t>12/3/25</a:t>
+              <a:t>12/4/25</a:t>
             </a:fld>
             <a:endParaRPr kumimoji="1" lang="ja-US" altLang="en-US"/>
           </a:p>
@@ -2656,7 +2658,7 @@
           <a:p>
             <a:fld id="{11089FC0-EF52-AB45-873F-5F173C052B95}" type="datetimeFigureOut">
               <a:rPr kumimoji="1" lang="ja-US" altLang="en-US" smtClean="0"/>
-              <a:t>12/3/25</a:t>
+              <a:t>12/4/25</a:t>
             </a:fld>
             <a:endParaRPr kumimoji="1" lang="ja-US" altLang="en-US"/>
           </a:p>
@@ -2945,7 +2947,7 @@
           <a:p>
             <a:fld id="{11089FC0-EF52-AB45-873F-5F173C052B95}" type="datetimeFigureOut">
               <a:rPr kumimoji="1" lang="ja-US" altLang="en-US" smtClean="0"/>
-              <a:t>12/3/25</a:t>
+              <a:t>12/4/25</a:t>
             </a:fld>
             <a:endParaRPr kumimoji="1" lang="ja-US" altLang="en-US"/>
           </a:p>
@@ -3220,7 +3222,7 @@
           <a:p>
             <a:fld id="{11089FC0-EF52-AB45-873F-5F173C052B95}" type="datetimeFigureOut">
               <a:rPr kumimoji="1" lang="ja-US" altLang="en-US" smtClean="0"/>
-              <a:t>12/3/25</a:t>
+              <a:t>12/4/25</a:t>
             </a:fld>
             <a:endParaRPr kumimoji="1" lang="ja-US" altLang="en-US"/>
           </a:p>
@@ -4564,149 +4566,12 @@
           <a:chExt cx="0" cy="0"/>
         </a:xfrm>
       </p:grpSpPr>
-      <p:sp>
-        <p:nvSpPr>
-          <p:cNvPr id="16" name="テキスト ボックス 15">
-            <a:extLst>
-              <a:ext uri="{FF2B5EF4-FFF2-40B4-BE49-F238E27FC236}">
-                <a16:creationId xmlns:a16="http://schemas.microsoft.com/office/drawing/2014/main" id="{AA67648C-F859-7D7B-1D2C-592AAA86FC81}"/>
-              </a:ext>
-            </a:extLst>
-          </p:cNvPr>
-          <p:cNvSpPr txBox="1"/>
-          <p:nvPr/>
-        </p:nvSpPr>
-        <p:spPr>
-          <a:xfrm>
-            <a:off x="5102689" y="586791"/>
-            <a:ext cx="6288901" cy="2677656"/>
-          </a:xfrm>
-          <a:prstGeom prst="rect">
-            <a:avLst/>
-          </a:prstGeom>
-          <a:noFill/>
-        </p:spPr>
-        <p:txBody>
-          <a:bodyPr wrap="none" rtlCol="0">
-            <a:spAutoFit/>
-          </a:bodyPr>
-          <a:lstStyle/>
-          <a:p>
-            <a:r>
-              <a:rPr kumimoji="1" lang="ja-US" altLang="en-US" sz="1400" dirty="0"/>
-              <a:t>変更点</a:t>
-            </a:r>
-            <a:r>
-              <a:rPr kumimoji="1" lang="en-US" altLang="ja-US" sz="1400" dirty="0"/>
-              <a:t>1</a:t>
-            </a:r>
-            <a:r>
-              <a:rPr kumimoji="1" lang="ja-US" altLang="en-US" sz="1400" dirty="0"/>
-              <a:t>：「▼未返信コメント」のトグルを廃止。</a:t>
-            </a:r>
-            <a:endParaRPr kumimoji="1" lang="en-US" altLang="ja-US" sz="1400" dirty="0"/>
-          </a:p>
-          <a:p>
-            <a:r>
-              <a:rPr kumimoji="1" lang="ja-US" altLang="en-US" sz="1400" dirty="0"/>
-              <a:t>返信したコメントなのか、返信してないコメントなのかは、</a:t>
-            </a:r>
-            <a:endParaRPr kumimoji="1" lang="en-US" altLang="ja-US" sz="1400" dirty="0"/>
-          </a:p>
-          <a:p>
-            <a:r>
-              <a:rPr kumimoji="1" lang="ja-US" altLang="en-US" sz="1400" dirty="0"/>
-              <a:t>ウィジェットの色で判断できるようにする。</a:t>
-            </a:r>
-            <a:endParaRPr kumimoji="1" lang="en-US" altLang="ja-US" sz="1400" dirty="0"/>
-          </a:p>
-          <a:p>
-            <a:r>
-              <a:rPr kumimoji="1" lang="ja-US" altLang="en-US" sz="1400" dirty="0"/>
-              <a:t>→デフォルトで未返信コメント（現状の色で</a:t>
-            </a:r>
-            <a:r>
-              <a:rPr kumimoji="1" lang="en-US" altLang="ja-US" sz="1400" dirty="0"/>
-              <a:t>OK</a:t>
-            </a:r>
-            <a:r>
-              <a:rPr kumimoji="1" lang="ja-US" altLang="en-US" sz="1400" dirty="0"/>
-              <a:t>）は上に並ぶようにして。</a:t>
-            </a:r>
-            <a:endParaRPr kumimoji="1" lang="en-US" altLang="ja-US" sz="1400" dirty="0"/>
-          </a:p>
-          <a:p>
-            <a:r>
-              <a:rPr kumimoji="1" lang="ja-US" altLang="en-US" sz="1400" dirty="0"/>
-              <a:t>→返信済みコメントはちょっと暗めの色とする。</a:t>
-            </a:r>
-            <a:endParaRPr kumimoji="1" lang="en-US" altLang="ja-US" sz="1400" dirty="0"/>
-          </a:p>
-          <a:p>
-            <a:endParaRPr kumimoji="1" lang="en-US" altLang="ja-US" sz="1400" dirty="0"/>
-          </a:p>
-          <a:p>
-            <a:r>
-              <a:rPr kumimoji="1" lang="ja-US" altLang="en-US" sz="1400" dirty="0"/>
-              <a:t>変更点</a:t>
-            </a:r>
-            <a:r>
-              <a:rPr kumimoji="1" lang="en-US" altLang="ja-US" sz="1400" dirty="0"/>
-              <a:t>2</a:t>
-            </a:r>
-            <a:r>
-              <a:rPr kumimoji="1" lang="ja-US" altLang="en-US" sz="1400" dirty="0"/>
-              <a:t>：「プロンプトをカスタムする」ボタンを廃止。</a:t>
-            </a:r>
-            <a:endParaRPr kumimoji="1" lang="en-US" altLang="ja-US" sz="1400" dirty="0"/>
-          </a:p>
-          <a:p>
-            <a:r>
-              <a:rPr kumimoji="1" lang="ja-US" altLang="en-US" sz="1400" dirty="0"/>
-              <a:t>より機能を減らす方向へ修正。</a:t>
-            </a:r>
-            <a:r>
-              <a:rPr kumimoji="1" lang="en-US" altLang="ja-US" sz="1400" dirty="0"/>
-              <a:t>1</a:t>
-            </a:r>
-            <a:r>
-              <a:rPr kumimoji="1" lang="ja-US" altLang="en-US" sz="1400" dirty="0"/>
-              <a:t>ウィジェットにコメントがあって、</a:t>
-            </a:r>
-            <a:endParaRPr kumimoji="1" lang="en-US" altLang="ja-US" sz="1400" dirty="0"/>
-          </a:p>
-          <a:p>
-            <a:r>
-              <a:rPr kumimoji="1" lang="ja-US" altLang="en-US" sz="1400" dirty="0"/>
-              <a:t>その下に「返信案を生成」ボタンを配置。</a:t>
-            </a:r>
-            <a:endParaRPr kumimoji="1" lang="en-US" altLang="ja-US" sz="1400" dirty="0"/>
-          </a:p>
-          <a:p>
-            <a:r>
-              <a:rPr kumimoji="1" lang="ja-US" altLang="en-US" sz="1400" dirty="0"/>
-              <a:t>さらに、デフォルトで、返信コメントのテキストボックスを配置しておく。</a:t>
-            </a:r>
-            <a:endParaRPr kumimoji="1" lang="en-US" altLang="ja-US" sz="1400" dirty="0"/>
-          </a:p>
-          <a:p>
-            <a:r>
-              <a:rPr kumimoji="1" lang="ja-US" altLang="en-US" sz="1400" dirty="0"/>
-              <a:t>これによって、自力で返信するケースにも対応。</a:t>
-            </a:r>
-            <a:endParaRPr kumimoji="1" lang="en-US" altLang="ja-US" sz="1400" dirty="0"/>
-          </a:p>
-          <a:p>
-            <a:endParaRPr kumimoji="1" lang="en-US" altLang="ja-US" sz="1400" dirty="0"/>
-          </a:p>
-        </p:txBody>
-      </p:sp>
       <p:pic>
         <p:nvPicPr>
-          <p:cNvPr id="6" name="図 5">
-            <a:extLst>
-              <a:ext uri="{FF2B5EF4-FFF2-40B4-BE49-F238E27FC236}">
-                <a16:creationId xmlns:a16="http://schemas.microsoft.com/office/drawing/2014/main" id="{CF269950-B53C-E8A3-C797-46C4D5214D99}"/>
+          <p:cNvPr id="2" name="図 1">
+            <a:extLst>
+              <a:ext uri="{FF2B5EF4-FFF2-40B4-BE49-F238E27FC236}">
+                <a16:creationId xmlns:a16="http://schemas.microsoft.com/office/drawing/2014/main" id="{936B888E-2C6E-AEF5-301C-3E294A86CD8A}"/>
               </a:ext>
             </a:extLst>
           </p:cNvPr>
@@ -4717,24 +4582,698 @@
         </p:nvPicPr>
         <p:blipFill>
           <a:blip r:embed="rId2"/>
+          <a:srcRect b="14746"/>
           <a:stretch>
             <a:fillRect/>
           </a:stretch>
         </p:blipFill>
         <p:spPr>
           <a:xfrm>
-            <a:off x="283298" y="229695"/>
-            <a:ext cx="4561971" cy="6398609"/>
+            <a:off x="412531" y="467125"/>
+            <a:ext cx="7772400" cy="3670310"/>
           </a:xfrm>
           <a:prstGeom prst="rect">
             <a:avLst/>
           </a:prstGeom>
         </p:spPr>
       </p:pic>
+      <p:sp>
+        <p:nvSpPr>
+          <p:cNvPr id="4" name="テキスト ボックス 3">
+            <a:extLst>
+              <a:ext uri="{FF2B5EF4-FFF2-40B4-BE49-F238E27FC236}">
+                <a16:creationId xmlns:a16="http://schemas.microsoft.com/office/drawing/2014/main" id="{3B39F3FE-053A-5EAB-B4FA-4E7C79142CFF}"/>
+              </a:ext>
+            </a:extLst>
+          </p:cNvPr>
+          <p:cNvSpPr txBox="1"/>
+          <p:nvPr/>
+        </p:nvSpPr>
+        <p:spPr>
+          <a:xfrm>
+            <a:off x="6629400" y="1211580"/>
+            <a:ext cx="2262158" cy="646331"/>
+          </a:xfrm>
+          <a:prstGeom prst="rect">
+            <a:avLst/>
+          </a:prstGeom>
+          <a:noFill/>
+        </p:spPr>
+        <p:txBody>
+          <a:bodyPr wrap="none" rtlCol="0">
+            <a:spAutoFit/>
+          </a:bodyPr>
+          <a:lstStyle/>
+          <a:p>
+            <a:r>
+              <a:rPr kumimoji="1" lang="ja-US" altLang="en-US" dirty="0"/>
+              <a:t>👍　👎に変更。</a:t>
+            </a:r>
+            <a:endParaRPr kumimoji="1" lang="en-US" altLang="ja-US" dirty="0"/>
+          </a:p>
+          <a:p>
+            <a:r>
+              <a:rPr kumimoji="1" lang="ja-US" altLang="en-US" dirty="0"/>
+              <a:t>🗑️とサイズを統一。</a:t>
+            </a:r>
+          </a:p>
+        </p:txBody>
+      </p:sp>
+      <p:sp>
+        <p:nvSpPr>
+          <p:cNvPr id="5" name="正方形/長方形 4">
+            <a:extLst>
+              <a:ext uri="{FF2B5EF4-FFF2-40B4-BE49-F238E27FC236}">
+                <a16:creationId xmlns:a16="http://schemas.microsoft.com/office/drawing/2014/main" id="{96F2170D-6671-7E8B-F59F-B263026648E9}"/>
+              </a:ext>
+            </a:extLst>
+          </p:cNvPr>
+          <p:cNvSpPr/>
+          <p:nvPr/>
+        </p:nvSpPr>
+        <p:spPr>
+          <a:xfrm>
+            <a:off x="669955" y="3150607"/>
+            <a:ext cx="6355533" cy="986828"/>
+          </a:xfrm>
+          <a:prstGeom prst="rect">
+            <a:avLst/>
+          </a:prstGeom>
+          <a:noFill/>
+        </p:spPr>
+        <p:style>
+          <a:lnRef idx="2">
+            <a:schemeClr val="accent1">
+              <a:shade val="15000"/>
+            </a:schemeClr>
+          </a:lnRef>
+          <a:fillRef idx="1">
+            <a:schemeClr val="accent1"/>
+          </a:fillRef>
+          <a:effectRef idx="0">
+            <a:schemeClr val="accent1"/>
+          </a:effectRef>
+          <a:fontRef idx="minor">
+            <a:schemeClr val="lt1"/>
+          </a:fontRef>
+        </p:style>
+        <p:txBody>
+          <a:bodyPr rtlCol="0" anchor="ctr"/>
+          <a:lstStyle/>
+          <a:p>
+            <a:pPr algn="ctr"/>
+            <a:endParaRPr kumimoji="1" lang="ja-US" altLang="en-US" dirty="0"/>
+          </a:p>
+        </p:txBody>
+      </p:sp>
+      <p:sp>
+        <p:nvSpPr>
+          <p:cNvPr id="7" name="テキスト ボックス 6">
+            <a:extLst>
+              <a:ext uri="{FF2B5EF4-FFF2-40B4-BE49-F238E27FC236}">
+                <a16:creationId xmlns:a16="http://schemas.microsoft.com/office/drawing/2014/main" id="{0F532423-426A-4109-FCD8-AFF016A12F25}"/>
+              </a:ext>
+            </a:extLst>
+          </p:cNvPr>
+          <p:cNvSpPr txBox="1"/>
+          <p:nvPr/>
+        </p:nvSpPr>
+        <p:spPr>
+          <a:xfrm>
+            <a:off x="4532498" y="3788877"/>
+            <a:ext cx="2492990" cy="369332"/>
+          </a:xfrm>
+          <a:prstGeom prst="rect">
+            <a:avLst/>
+          </a:prstGeom>
+          <a:noFill/>
+        </p:spPr>
+        <p:txBody>
+          <a:bodyPr wrap="none" rtlCol="0">
+            <a:spAutoFit/>
+          </a:bodyPr>
+          <a:lstStyle/>
+          <a:p>
+            <a:r>
+              <a:rPr kumimoji="1" lang="ja-US" altLang="en-US" dirty="0"/>
+              <a:t>返信を入力画面を拡張</a:t>
+            </a:r>
+          </a:p>
+        </p:txBody>
+      </p:sp>
+      <p:pic>
+        <p:nvPicPr>
+          <p:cNvPr id="8" name="図 7">
+            <a:extLst>
+              <a:ext uri="{FF2B5EF4-FFF2-40B4-BE49-F238E27FC236}">
+                <a16:creationId xmlns:a16="http://schemas.microsoft.com/office/drawing/2014/main" id="{758CC855-0601-C20A-64E8-FC846578F747}"/>
+              </a:ext>
+            </a:extLst>
+          </p:cNvPr>
+          <p:cNvPicPr>
+            <a:picLocks noChangeAspect="1"/>
+          </p:cNvPicPr>
+          <p:nvPr/>
+        </p:nvPicPr>
+        <p:blipFill>
+          <a:blip r:embed="rId3"/>
+          <a:srcRect l="19441" t="14165" r="55135" b="14548"/>
+          <a:stretch>
+            <a:fillRect/>
+          </a:stretch>
+        </p:blipFill>
+        <p:spPr>
+          <a:xfrm>
+            <a:off x="7298753" y="3567067"/>
+            <a:ext cx="461726" cy="443620"/>
+          </a:xfrm>
+          <a:prstGeom prst="rect">
+            <a:avLst/>
+          </a:prstGeom>
+        </p:spPr>
+      </p:pic>
+      <p:sp>
+        <p:nvSpPr>
+          <p:cNvPr id="9" name="テキスト ボックス 8">
+            <a:extLst>
+              <a:ext uri="{FF2B5EF4-FFF2-40B4-BE49-F238E27FC236}">
+                <a16:creationId xmlns:a16="http://schemas.microsoft.com/office/drawing/2014/main" id="{87AC5975-7C72-C468-6A77-EC66A548F99E}"/>
+              </a:ext>
+            </a:extLst>
+          </p:cNvPr>
+          <p:cNvSpPr txBox="1"/>
+          <p:nvPr/>
+        </p:nvSpPr>
+        <p:spPr>
+          <a:xfrm>
+            <a:off x="6398568" y="4356727"/>
+            <a:ext cx="2492990" cy="369332"/>
+          </a:xfrm>
+          <a:prstGeom prst="rect">
+            <a:avLst/>
+          </a:prstGeom>
+          <a:noFill/>
+        </p:spPr>
+        <p:txBody>
+          <a:bodyPr wrap="none" rtlCol="0">
+            <a:spAutoFit/>
+          </a:bodyPr>
+          <a:lstStyle/>
+          <a:p>
+            <a:r>
+              <a:rPr kumimoji="1" lang="ja-US" altLang="en-US" dirty="0"/>
+              <a:t>返信ボタンを簡易的に</a:t>
+            </a:r>
+          </a:p>
+        </p:txBody>
+      </p:sp>
+      <p:sp>
+        <p:nvSpPr>
+          <p:cNvPr id="10" name="テキスト ボックス 9">
+            <a:extLst>
+              <a:ext uri="{FF2B5EF4-FFF2-40B4-BE49-F238E27FC236}">
+                <a16:creationId xmlns:a16="http://schemas.microsoft.com/office/drawing/2014/main" id="{B2D34019-0589-2189-FAAD-EEADCB1D903F}"/>
+              </a:ext>
+            </a:extLst>
+          </p:cNvPr>
+          <p:cNvSpPr txBox="1"/>
+          <p:nvPr/>
+        </p:nvSpPr>
+        <p:spPr>
+          <a:xfrm>
+            <a:off x="5136844" y="2056429"/>
+            <a:ext cx="2523448" cy="369332"/>
+          </a:xfrm>
+          <a:prstGeom prst="rect">
+            <a:avLst/>
+          </a:prstGeom>
+          <a:noFill/>
+        </p:spPr>
+        <p:txBody>
+          <a:bodyPr wrap="none" rtlCol="0">
+            <a:spAutoFit/>
+          </a:bodyPr>
+          <a:lstStyle/>
+          <a:p>
+            <a:r>
+              <a:rPr kumimoji="1" lang="ja-US" altLang="en-US" dirty="0"/>
+              <a:t>↑線が</a:t>
+            </a:r>
+            <a:r>
+              <a:rPr kumimoji="1" lang="en-US" altLang="ja-US" dirty="0"/>
+              <a:t>2</a:t>
+            </a:r>
+            <a:r>
+              <a:rPr kumimoji="1" lang="ja-US" altLang="en-US" dirty="0"/>
+              <a:t>本あるのを削除</a:t>
+            </a:r>
+          </a:p>
+        </p:txBody>
+      </p:sp>
     </p:spTree>
     <p:extLst>
       <p:ext uri="{BB962C8B-B14F-4D97-AF65-F5344CB8AC3E}">
         <p14:creationId xmlns:p14="http://schemas.microsoft.com/office/powerpoint/2010/main" val="2989435209"/>
+      </p:ext>
+    </p:extLst>
+  </p:cSld>
+  <p:clrMapOvr>
+    <a:masterClrMapping/>
+  </p:clrMapOvr>
+</p:sld>
+</file>
+
+<file path=ppt/slides/slide4.xml><?xml version="1.0" encoding="utf-8"?>
+<p:sld xmlns:a="http://schemas.openxmlformats.org/drawingml/2006/main" xmlns:r="http://schemas.openxmlformats.org/officeDocument/2006/relationships" xmlns:p="http://schemas.openxmlformats.org/presentationml/2006/main">
+  <p:cSld>
+    <p:spTree>
+      <p:nvGrpSpPr>
+        <p:cNvPr id="1" name="">
+          <a:extLst>
+            <a:ext uri="{FF2B5EF4-FFF2-40B4-BE49-F238E27FC236}">
+              <a16:creationId xmlns:a16="http://schemas.microsoft.com/office/drawing/2014/main" id="{4FBE6BBF-674A-5A64-217B-A1E51B1D5C67}"/>
+            </a:ext>
+          </a:extLst>
+        </p:cNvPr>
+        <p:cNvGrpSpPr/>
+        <p:nvPr/>
+      </p:nvGrpSpPr>
+      <p:grpSpPr>
+        <a:xfrm>
+          <a:off x="0" y="0"/>
+          <a:ext cx="0" cy="0"/>
+          <a:chOff x="0" y="0"/>
+          <a:chExt cx="0" cy="0"/>
+        </a:xfrm>
+      </p:grpSpPr>
+      <p:sp>
+        <p:nvSpPr>
+          <p:cNvPr id="4" name="正方形/長方形 3">
+            <a:extLst>
+              <a:ext uri="{FF2B5EF4-FFF2-40B4-BE49-F238E27FC236}">
+                <a16:creationId xmlns:a16="http://schemas.microsoft.com/office/drawing/2014/main" id="{E20DF1A0-7D79-6EA1-D1E3-7456288FC96D}"/>
+              </a:ext>
+            </a:extLst>
+          </p:cNvPr>
+          <p:cNvSpPr/>
+          <p:nvPr/>
+        </p:nvSpPr>
+        <p:spPr>
+          <a:xfrm>
+            <a:off x="432552" y="497174"/>
+            <a:ext cx="3360470" cy="5152910"/>
+          </a:xfrm>
+          <a:prstGeom prst="rect">
+            <a:avLst/>
+          </a:prstGeom>
+          <a:noFill/>
+        </p:spPr>
+        <p:style>
+          <a:lnRef idx="2">
+            <a:schemeClr val="accent1">
+              <a:shade val="15000"/>
+            </a:schemeClr>
+          </a:lnRef>
+          <a:fillRef idx="1">
+            <a:schemeClr val="accent1"/>
+          </a:fillRef>
+          <a:effectRef idx="0">
+            <a:schemeClr val="accent1"/>
+          </a:effectRef>
+          <a:fontRef idx="minor">
+            <a:schemeClr val="lt1"/>
+          </a:fontRef>
+        </p:style>
+        <p:txBody>
+          <a:bodyPr rtlCol="0" anchor="ctr"/>
+          <a:lstStyle/>
+          <a:p>
+            <a:pPr algn="ctr"/>
+            <a:endParaRPr kumimoji="1" lang="ja-US" altLang="en-US" dirty="0"/>
+          </a:p>
+        </p:txBody>
+      </p:sp>
+      <p:sp>
+        <p:nvSpPr>
+          <p:cNvPr id="5" name="テキスト ボックス 4">
+            <a:extLst>
+              <a:ext uri="{FF2B5EF4-FFF2-40B4-BE49-F238E27FC236}">
+                <a16:creationId xmlns:a16="http://schemas.microsoft.com/office/drawing/2014/main" id="{A1AAE156-0B14-CEB7-AF7E-AAF94145AE8C}"/>
+              </a:ext>
+            </a:extLst>
+          </p:cNvPr>
+          <p:cNvSpPr txBox="1"/>
+          <p:nvPr/>
+        </p:nvSpPr>
+        <p:spPr>
+          <a:xfrm>
+            <a:off x="2431856" y="88733"/>
+            <a:ext cx="1569660" cy="369332"/>
+          </a:xfrm>
+          <a:prstGeom prst="rect">
+            <a:avLst/>
+          </a:prstGeom>
+          <a:noFill/>
+        </p:spPr>
+        <p:txBody>
+          <a:bodyPr wrap="none" rtlCol="0">
+            <a:spAutoFit/>
+          </a:bodyPr>
+          <a:lstStyle/>
+          <a:p>
+            <a:r>
+              <a:rPr kumimoji="1" lang="ja-US" altLang="en-US" dirty="0"/>
+              <a:t>モバイル画面</a:t>
+            </a:r>
+          </a:p>
+        </p:txBody>
+      </p:sp>
+      <p:sp>
+        <p:nvSpPr>
+          <p:cNvPr id="6" name="正方形/長方形 5">
+            <a:extLst>
+              <a:ext uri="{FF2B5EF4-FFF2-40B4-BE49-F238E27FC236}">
+                <a16:creationId xmlns:a16="http://schemas.microsoft.com/office/drawing/2014/main" id="{71A6E70F-86FA-A16B-0C89-D3053095B6B1}"/>
+              </a:ext>
+            </a:extLst>
+          </p:cNvPr>
+          <p:cNvSpPr/>
+          <p:nvPr/>
+        </p:nvSpPr>
+        <p:spPr>
+          <a:xfrm>
+            <a:off x="609314" y="1190333"/>
+            <a:ext cx="1466587" cy="1227552"/>
+          </a:xfrm>
+          <a:prstGeom prst="rect">
+            <a:avLst/>
+          </a:prstGeom>
+        </p:spPr>
+        <p:style>
+          <a:lnRef idx="2">
+            <a:schemeClr val="accent1">
+              <a:shade val="15000"/>
+            </a:schemeClr>
+          </a:lnRef>
+          <a:fillRef idx="1">
+            <a:schemeClr val="accent1"/>
+          </a:fillRef>
+          <a:effectRef idx="0">
+            <a:schemeClr val="accent1"/>
+          </a:effectRef>
+          <a:fontRef idx="minor">
+            <a:schemeClr val="lt1"/>
+          </a:fontRef>
+        </p:style>
+        <p:txBody>
+          <a:bodyPr rtlCol="0" anchor="ctr"/>
+          <a:lstStyle/>
+          <a:p>
+            <a:pPr algn="ctr"/>
+            <a:r>
+              <a:rPr kumimoji="1" lang="ja-US" altLang="en-US" dirty="0"/>
+              <a:t>サムネイル</a:t>
+            </a:r>
+            <a:r>
+              <a:rPr kumimoji="1" lang="en-US" altLang="ja-US" dirty="0"/>
+              <a:t>1</a:t>
+            </a:r>
+            <a:endParaRPr kumimoji="1" lang="ja-US" altLang="en-US" dirty="0"/>
+          </a:p>
+        </p:txBody>
+      </p:sp>
+      <p:sp>
+        <p:nvSpPr>
+          <p:cNvPr id="7" name="テキスト ボックス 6">
+            <a:extLst>
+              <a:ext uri="{FF2B5EF4-FFF2-40B4-BE49-F238E27FC236}">
+                <a16:creationId xmlns:a16="http://schemas.microsoft.com/office/drawing/2014/main" id="{9177AE3B-098E-A776-8E10-4924C10B044B}"/>
+              </a:ext>
+            </a:extLst>
+          </p:cNvPr>
+          <p:cNvSpPr txBox="1"/>
+          <p:nvPr/>
+        </p:nvSpPr>
+        <p:spPr>
+          <a:xfrm>
+            <a:off x="2093485" y="1199124"/>
+            <a:ext cx="1569660" cy="1200329"/>
+          </a:xfrm>
+          <a:prstGeom prst="rect">
+            <a:avLst/>
+          </a:prstGeom>
+          <a:noFill/>
+        </p:spPr>
+        <p:txBody>
+          <a:bodyPr wrap="none" rtlCol="0">
+            <a:spAutoFit/>
+          </a:bodyPr>
+          <a:lstStyle/>
+          <a:p>
+            <a:r>
+              <a:rPr kumimoji="1" lang="ja-US" altLang="en-US" dirty="0"/>
+              <a:t>投稿日</a:t>
+            </a:r>
+            <a:endParaRPr kumimoji="1" lang="en-US" altLang="ja-US" dirty="0"/>
+          </a:p>
+          <a:p>
+            <a:r>
+              <a:rPr kumimoji="1" lang="ja-US" altLang="en-US" dirty="0"/>
+              <a:t>再生回数</a:t>
+            </a:r>
+            <a:endParaRPr kumimoji="1" lang="en-US" altLang="ja-US" dirty="0"/>
+          </a:p>
+          <a:p>
+            <a:r>
+              <a:rPr kumimoji="1" lang="ja-US" altLang="en-US" dirty="0"/>
+              <a:t>合計視聴時間</a:t>
+            </a:r>
+            <a:endParaRPr kumimoji="1" lang="en-US" altLang="ja-US" dirty="0"/>
+          </a:p>
+          <a:p>
+            <a:r>
+              <a:rPr kumimoji="1" lang="ja-US" altLang="en-US" dirty="0"/>
+              <a:t>平均視聴時間</a:t>
+            </a:r>
+            <a:endParaRPr kumimoji="1" lang="en-US" altLang="ja-US" dirty="0"/>
+          </a:p>
+        </p:txBody>
+      </p:sp>
+      <p:sp>
+        <p:nvSpPr>
+          <p:cNvPr id="8" name="正方形/長方形 7">
+            <a:extLst>
+              <a:ext uri="{FF2B5EF4-FFF2-40B4-BE49-F238E27FC236}">
+                <a16:creationId xmlns:a16="http://schemas.microsoft.com/office/drawing/2014/main" id="{F5E17574-2A4B-9E60-E32A-71C66B41EAC5}"/>
+              </a:ext>
+            </a:extLst>
+          </p:cNvPr>
+          <p:cNvSpPr/>
+          <p:nvPr/>
+        </p:nvSpPr>
+        <p:spPr>
+          <a:xfrm>
+            <a:off x="600522" y="2506059"/>
+            <a:ext cx="1466587" cy="1227552"/>
+          </a:xfrm>
+          <a:prstGeom prst="rect">
+            <a:avLst/>
+          </a:prstGeom>
+        </p:spPr>
+        <p:style>
+          <a:lnRef idx="2">
+            <a:schemeClr val="accent1">
+              <a:shade val="15000"/>
+            </a:schemeClr>
+          </a:lnRef>
+          <a:fillRef idx="1">
+            <a:schemeClr val="accent1"/>
+          </a:fillRef>
+          <a:effectRef idx="0">
+            <a:schemeClr val="accent1"/>
+          </a:effectRef>
+          <a:fontRef idx="minor">
+            <a:schemeClr val="lt1"/>
+          </a:fontRef>
+        </p:style>
+        <p:txBody>
+          <a:bodyPr rtlCol="0" anchor="ctr"/>
+          <a:lstStyle/>
+          <a:p>
+            <a:pPr algn="ctr"/>
+            <a:r>
+              <a:rPr kumimoji="1" lang="ja-US" altLang="en-US" dirty="0"/>
+              <a:t>サムネイル</a:t>
+            </a:r>
+            <a:r>
+              <a:rPr kumimoji="1" lang="en-US" altLang="ja-US" dirty="0"/>
+              <a:t>2</a:t>
+            </a:r>
+            <a:endParaRPr kumimoji="1" lang="ja-US" altLang="en-US" dirty="0"/>
+          </a:p>
+        </p:txBody>
+      </p:sp>
+      <p:sp>
+        <p:nvSpPr>
+          <p:cNvPr id="9" name="テキスト ボックス 8">
+            <a:extLst>
+              <a:ext uri="{FF2B5EF4-FFF2-40B4-BE49-F238E27FC236}">
+                <a16:creationId xmlns:a16="http://schemas.microsoft.com/office/drawing/2014/main" id="{1C0E6632-2E17-8F6C-59B6-E8A8372BF53D}"/>
+              </a:ext>
+            </a:extLst>
+          </p:cNvPr>
+          <p:cNvSpPr txBox="1"/>
+          <p:nvPr/>
+        </p:nvSpPr>
+        <p:spPr>
+          <a:xfrm>
+            <a:off x="2084693" y="2514850"/>
+            <a:ext cx="1569660" cy="1200329"/>
+          </a:xfrm>
+          <a:prstGeom prst="rect">
+            <a:avLst/>
+          </a:prstGeom>
+          <a:noFill/>
+        </p:spPr>
+        <p:txBody>
+          <a:bodyPr wrap="none" rtlCol="0">
+            <a:spAutoFit/>
+          </a:bodyPr>
+          <a:lstStyle/>
+          <a:p>
+            <a:r>
+              <a:rPr kumimoji="1" lang="ja-US" altLang="en-US" dirty="0"/>
+              <a:t>投稿日</a:t>
+            </a:r>
+            <a:endParaRPr kumimoji="1" lang="en-US" altLang="ja-US" dirty="0"/>
+          </a:p>
+          <a:p>
+            <a:r>
+              <a:rPr kumimoji="1" lang="ja-US" altLang="en-US" dirty="0"/>
+              <a:t>再生回数</a:t>
+            </a:r>
+            <a:endParaRPr kumimoji="1" lang="en-US" altLang="ja-US" dirty="0"/>
+          </a:p>
+          <a:p>
+            <a:r>
+              <a:rPr kumimoji="1" lang="ja-US" altLang="en-US" dirty="0"/>
+              <a:t>合計視聴時間</a:t>
+            </a:r>
+            <a:endParaRPr kumimoji="1" lang="en-US" altLang="ja-US" dirty="0"/>
+          </a:p>
+          <a:p>
+            <a:r>
+              <a:rPr kumimoji="1" lang="ja-US" altLang="en-US" dirty="0"/>
+              <a:t>平均視聴時間</a:t>
+            </a:r>
+            <a:endParaRPr kumimoji="1" lang="en-US" altLang="ja-US" dirty="0"/>
+          </a:p>
+        </p:txBody>
+      </p:sp>
+      <p:sp>
+        <p:nvSpPr>
+          <p:cNvPr id="10" name="テキスト ボックス 9">
+            <a:extLst>
+              <a:ext uri="{FF2B5EF4-FFF2-40B4-BE49-F238E27FC236}">
+                <a16:creationId xmlns:a16="http://schemas.microsoft.com/office/drawing/2014/main" id="{C7B7DDD1-E0F6-083C-1ACC-EE8C7D73EF4F}"/>
+              </a:ext>
+            </a:extLst>
+          </p:cNvPr>
+          <p:cNvSpPr txBox="1"/>
+          <p:nvPr/>
+        </p:nvSpPr>
+        <p:spPr>
+          <a:xfrm>
+            <a:off x="1995854" y="3938954"/>
+            <a:ext cx="415498" cy="369332"/>
+          </a:xfrm>
+          <a:prstGeom prst="rect">
+            <a:avLst/>
+          </a:prstGeom>
+          <a:noFill/>
+        </p:spPr>
+        <p:txBody>
+          <a:bodyPr wrap="none" rtlCol="0">
+            <a:spAutoFit/>
+          </a:bodyPr>
+          <a:lstStyle/>
+          <a:p>
+            <a:r>
+              <a:rPr kumimoji="1" lang="ja-US" altLang="en-US" dirty="0"/>
+              <a:t>︙</a:t>
+            </a:r>
+          </a:p>
+        </p:txBody>
+      </p:sp>
+      <p:sp>
+        <p:nvSpPr>
+          <p:cNvPr id="11" name="テキスト ボックス 10">
+            <a:extLst>
+              <a:ext uri="{FF2B5EF4-FFF2-40B4-BE49-F238E27FC236}">
+                <a16:creationId xmlns:a16="http://schemas.microsoft.com/office/drawing/2014/main" id="{46361C43-2C01-B13F-DC99-3970BFB22473}"/>
+              </a:ext>
+            </a:extLst>
+          </p:cNvPr>
+          <p:cNvSpPr txBox="1"/>
+          <p:nvPr/>
+        </p:nvSpPr>
+        <p:spPr>
+          <a:xfrm>
+            <a:off x="2200109" y="681840"/>
+            <a:ext cx="1338828" cy="369332"/>
+          </a:xfrm>
+          <a:prstGeom prst="rect">
+            <a:avLst/>
+          </a:prstGeom>
+          <a:noFill/>
+        </p:spPr>
+        <p:txBody>
+          <a:bodyPr wrap="none" rtlCol="0">
+            <a:spAutoFit/>
+          </a:bodyPr>
+          <a:lstStyle/>
+          <a:p>
+            <a:r>
+              <a:rPr kumimoji="1" lang="ja-US" altLang="en-US" dirty="0"/>
+              <a:t>並び替え：</a:t>
+            </a:r>
+          </a:p>
+        </p:txBody>
+      </p:sp>
+    </p:spTree>
+    <p:extLst>
+      <p:ext uri="{BB962C8B-B14F-4D97-AF65-F5344CB8AC3E}">
+        <p14:creationId xmlns:p14="http://schemas.microsoft.com/office/powerpoint/2010/main" val="887760667"/>
+      </p:ext>
+    </p:extLst>
+  </p:cSld>
+  <p:clrMapOvr>
+    <a:masterClrMapping/>
+  </p:clrMapOvr>
+</p:sld>
+</file>
+
+<file path=ppt/slides/slide5.xml><?xml version="1.0" encoding="utf-8"?>
+<p:sld xmlns:a="http://schemas.openxmlformats.org/drawingml/2006/main" xmlns:r="http://schemas.openxmlformats.org/officeDocument/2006/relationships" xmlns:p="http://schemas.openxmlformats.org/presentationml/2006/main">
+  <p:cSld>
+    <p:spTree>
+      <p:nvGrpSpPr>
+        <p:cNvPr id="1" name=""/>
+        <p:cNvGrpSpPr/>
+        <p:nvPr/>
+      </p:nvGrpSpPr>
+      <p:grpSpPr>
+        <a:xfrm>
+          <a:off x="0" y="0"/>
+          <a:ext cx="0" cy="0"/>
+          <a:chOff x="0" y="0"/>
+          <a:chExt cx="0" cy="0"/>
+        </a:xfrm>
+      </p:grpSpPr>
+    </p:spTree>
+    <p:extLst>
+      <p:ext uri="{BB962C8B-B14F-4D97-AF65-F5344CB8AC3E}">
+        <p14:creationId xmlns:p14="http://schemas.microsoft.com/office/powerpoint/2010/main" val="385243936"/>
       </p:ext>
     </p:extLst>
   </p:cSld>

</xml_diff>